<commit_message>
Update after thesis submission with desktop version
</commit_message>
<xml_diff>
--- a/Introduction/epigenetics_gene_regulation_figure.pptx
+++ b/Introduction/epigenetics_gene_regulation_figure.pptx
@@ -244,7 +244,7 @@
           <a:p>
             <a:fld id="{9CB17A0B-8C87-4EBD-BD1D-534AEC2F2814}" type="datetimeFigureOut">
               <a:rPr lang="en-US" smtClean="0"/>
-              <a:t>1/7/2019</a:t>
+              <a:t>1/16/2019</a:t>
             </a:fld>
             <a:endParaRPr lang="en-US"/>
           </a:p>
@@ -414,7 +414,7 @@
           <a:p>
             <a:fld id="{9CB17A0B-8C87-4EBD-BD1D-534AEC2F2814}" type="datetimeFigureOut">
               <a:rPr lang="en-US" smtClean="0"/>
-              <a:t>1/7/2019</a:t>
+              <a:t>1/16/2019</a:t>
             </a:fld>
             <a:endParaRPr lang="en-US"/>
           </a:p>
@@ -594,7 +594,7 @@
           <a:p>
             <a:fld id="{9CB17A0B-8C87-4EBD-BD1D-534AEC2F2814}" type="datetimeFigureOut">
               <a:rPr lang="en-US" smtClean="0"/>
-              <a:t>1/7/2019</a:t>
+              <a:t>1/16/2019</a:t>
             </a:fld>
             <a:endParaRPr lang="en-US"/>
           </a:p>
@@ -764,7 +764,7 @@
           <a:p>
             <a:fld id="{9CB17A0B-8C87-4EBD-BD1D-534AEC2F2814}" type="datetimeFigureOut">
               <a:rPr lang="en-US" smtClean="0"/>
-              <a:t>1/7/2019</a:t>
+              <a:t>1/16/2019</a:t>
             </a:fld>
             <a:endParaRPr lang="en-US"/>
           </a:p>
@@ -1008,7 +1008,7 @@
           <a:p>
             <a:fld id="{9CB17A0B-8C87-4EBD-BD1D-534AEC2F2814}" type="datetimeFigureOut">
               <a:rPr lang="en-US" smtClean="0"/>
-              <a:t>1/7/2019</a:t>
+              <a:t>1/16/2019</a:t>
             </a:fld>
             <a:endParaRPr lang="en-US"/>
           </a:p>
@@ -1240,7 +1240,7 @@
           <a:p>
             <a:fld id="{9CB17A0B-8C87-4EBD-BD1D-534AEC2F2814}" type="datetimeFigureOut">
               <a:rPr lang="en-US" smtClean="0"/>
-              <a:t>1/7/2019</a:t>
+              <a:t>1/16/2019</a:t>
             </a:fld>
             <a:endParaRPr lang="en-US"/>
           </a:p>
@@ -1607,7 +1607,7 @@
           <a:p>
             <a:fld id="{9CB17A0B-8C87-4EBD-BD1D-534AEC2F2814}" type="datetimeFigureOut">
               <a:rPr lang="en-US" smtClean="0"/>
-              <a:t>1/7/2019</a:t>
+              <a:t>1/16/2019</a:t>
             </a:fld>
             <a:endParaRPr lang="en-US"/>
           </a:p>
@@ -1725,7 +1725,7 @@
           <a:p>
             <a:fld id="{9CB17A0B-8C87-4EBD-BD1D-534AEC2F2814}" type="datetimeFigureOut">
               <a:rPr lang="en-US" smtClean="0"/>
-              <a:t>1/7/2019</a:t>
+              <a:t>1/16/2019</a:t>
             </a:fld>
             <a:endParaRPr lang="en-US"/>
           </a:p>
@@ -1820,7 +1820,7 @@
           <a:p>
             <a:fld id="{9CB17A0B-8C87-4EBD-BD1D-534AEC2F2814}" type="datetimeFigureOut">
               <a:rPr lang="en-US" smtClean="0"/>
-              <a:t>1/7/2019</a:t>
+              <a:t>1/16/2019</a:t>
             </a:fld>
             <a:endParaRPr lang="en-US"/>
           </a:p>
@@ -2097,7 +2097,7 @@
           <a:p>
             <a:fld id="{9CB17A0B-8C87-4EBD-BD1D-534AEC2F2814}" type="datetimeFigureOut">
               <a:rPr lang="en-US" smtClean="0"/>
-              <a:t>1/7/2019</a:t>
+              <a:t>1/16/2019</a:t>
             </a:fld>
             <a:endParaRPr lang="en-US"/>
           </a:p>
@@ -2354,7 +2354,7 @@
           <a:p>
             <a:fld id="{9CB17A0B-8C87-4EBD-BD1D-534AEC2F2814}" type="datetimeFigureOut">
               <a:rPr lang="en-US" smtClean="0"/>
-              <a:t>1/7/2019</a:t>
+              <a:t>1/16/2019</a:t>
             </a:fld>
             <a:endParaRPr lang="en-US"/>
           </a:p>
@@ -2567,7 +2567,7 @@
           <a:p>
             <a:fld id="{9CB17A0B-8C87-4EBD-BD1D-534AEC2F2814}" type="datetimeFigureOut">
               <a:rPr lang="en-US" smtClean="0"/>
-              <a:t>1/7/2019</a:t>
+              <a:t>1/16/2019</a:t>
             </a:fld>
             <a:endParaRPr lang="en-US"/>
           </a:p>
@@ -3751,7 +3751,7 @@
         </p:blipFill>
         <p:spPr bwMode="auto">
           <a:xfrm>
-            <a:off x="-2751567" y="6090209"/>
+            <a:off x="-3710572" y="5904356"/>
             <a:ext cx="4958720" cy="6225969"/>
           </a:xfrm>
           <a:prstGeom prst="rect">
@@ -7243,8 +7243,8 @@
         </p:nvSpPr>
         <p:spPr>
           <a:xfrm>
-            <a:off x="3051919" y="2820330"/>
-            <a:ext cx="951702" cy="568070"/>
+            <a:off x="3131649" y="2842118"/>
+            <a:ext cx="867240" cy="470977"/>
           </a:xfrm>
           <a:prstGeom prst="hexagon">
             <a:avLst/>
@@ -7443,7 +7443,7 @@
         </p:nvSpPr>
         <p:spPr>
           <a:xfrm>
-            <a:off x="3465095" y="5111015"/>
+            <a:off x="4940407" y="4503907"/>
             <a:ext cx="837398" cy="154011"/>
           </a:xfrm>
           <a:custGeom>

</xml_diff>